<commit_message>
report exemple added & reviev for presentation
</commit_message>
<xml_diff>
--- a/Диплом/Диплом презентація.pptx
+++ b/Диплом/Диплом презентація.pptx
@@ -5,7 +5,7 @@
     <p:sldMasterId id="2147483648" r:id="rId1"/>
   </p:sldMasterIdLst>
   <p:notesMasterIdLst>
-    <p:notesMasterId r:id="rId34"/>
+    <p:notesMasterId r:id="rId33"/>
   </p:notesMasterIdLst>
   <p:sldIdLst>
     <p:sldId id="256" r:id="rId2"/>
@@ -16,7 +16,7 @@
     <p:sldId id="262" r:id="rId7"/>
     <p:sldId id="263" r:id="rId8"/>
     <p:sldId id="264" r:id="rId9"/>
-    <p:sldId id="265" r:id="rId10"/>
+    <p:sldId id="288" r:id="rId10"/>
     <p:sldId id="266" r:id="rId11"/>
     <p:sldId id="269" r:id="rId12"/>
     <p:sldId id="268" r:id="rId13"/>
@@ -38,8 +38,7 @@
     <p:sldId id="286" r:id="rId29"/>
     <p:sldId id="285" r:id="rId30"/>
     <p:sldId id="270" r:id="rId31"/>
-    <p:sldId id="287" r:id="rId32"/>
-    <p:sldId id="257" r:id="rId33"/>
+    <p:sldId id="257" r:id="rId32"/>
   </p:sldIdLst>
   <p:sldSz cx="12192000" cy="6858000"/>
   <p:notesSz cx="6858000" cy="9144000"/>
@@ -3447,20 +3446,20 @@
           <p:nvPr>
             <p:extLst>
               <p:ext uri="{D42A27DB-BD31-4B8C-83A1-F6EECF244321}">
-                <p14:modId xmlns:p14="http://schemas.microsoft.com/office/powerpoint/2010/main" val="956593990"/>
+                <p14:modId xmlns:p14="http://schemas.microsoft.com/office/powerpoint/2010/main" val="3993957560"/>
               </p:ext>
             </p:extLst>
           </p:nvPr>
         </p:nvGraphicFramePr>
         <p:xfrm>
-          <a:off x="1828800" y="219075"/>
-          <a:ext cx="8394700" cy="6318250"/>
+          <a:off x="1828800" y="220663"/>
+          <a:ext cx="8359775" cy="6294437"/>
         </p:xfrm>
         <a:graphic>
           <a:graphicData uri="http://schemas.openxmlformats.org/presentationml/2006/ole">
             <mc:AlternateContent xmlns:mc="http://schemas.openxmlformats.org/markup-compatibility/2006">
               <mc:Choice xmlns:v="urn:schemas-microsoft-com:vml" Requires="v">
-                <p:oleObj spid="_x0000_s1061" name="Документ" r:id="rId4" imgW="6295790" imgH="4740290" progId="Word.Document.12">
+                <p:oleObj spid="_x0000_s1065" name="Документ" r:id="rId4" imgW="6295790" imgH="4740290" progId="Word.Document.12">
                   <p:embed/>
                 </p:oleObj>
               </mc:Choice>
@@ -3481,8 +3480,8 @@
                     </p:blipFill>
                     <p:spPr>
                       <a:xfrm>
-                        <a:off x="1828800" y="219075"/>
-                        <a:ext cx="8394700" cy="6318250"/>
+                        <a:off x="1828800" y="220663"/>
+                        <a:ext cx="8359775" cy="6294437"/>
                       </a:xfrm>
                       <a:prstGeom prst="rect">
                         <a:avLst/>
@@ -4008,7 +4007,14 @@
                 <a:latin typeface="Times New Roman" panose="02020603050405020304" pitchFamily="18" charset="0"/>
                 <a:cs typeface="Times New Roman" panose="02020603050405020304" pitchFamily="18" charset="0"/>
               </a:rPr>
-              <a:t>Обрання технологій для реалізації</a:t>
+              <a:t>Технологій </a:t>
+            </a:r>
+            <a:r>
+              <a:rPr lang="uk-UA" b="1" dirty="0" smtClean="0">
+                <a:latin typeface="Times New Roman" panose="02020603050405020304" pitchFamily="18" charset="0"/>
+                <a:cs typeface="Times New Roman" panose="02020603050405020304" pitchFamily="18" charset="0"/>
+              </a:rPr>
+              <a:t>для реалізації</a:t>
             </a:r>
           </a:p>
           <a:p>
@@ -6869,8 +6875,8 @@
         </p:nvSpPr>
         <p:spPr>
           <a:xfrm>
-            <a:off x="378308" y="1572126"/>
-            <a:ext cx="11380554" cy="4278094"/>
+            <a:off x="176446" y="965742"/>
+            <a:ext cx="11380554" cy="5940088"/>
           </a:xfrm>
           <a:prstGeom prst="rect">
             <a:avLst/>
@@ -6896,6 +6902,20 @@
               <a:t> пацієнтів. Або звичайне збереження документів, наприклад про закінчення вищої освіти чи проходження якогось курсу.</a:t>
             </a:r>
             <a:endParaRPr lang="ru-RU" sz="3400" dirty="0" smtClean="0"/>
+          </a:p>
+          <a:p>
+            <a:r>
+              <a:rPr lang="uk-UA" sz="3600" dirty="0"/>
+              <a:t>Також, можна зберігати невеликі програми, що можна використовувати як спрощену альтернативу смарт-контрактів </a:t>
+            </a:r>
+            <a:r>
+              <a:rPr lang="uk-UA" sz="3600" dirty="0" err="1"/>
+              <a:t>Ethereum</a:t>
+            </a:r>
+            <a:r>
+              <a:rPr lang="uk-UA" sz="3600" dirty="0" smtClean="0"/>
+              <a:t>.</a:t>
+            </a:r>
           </a:p>
           <a:p>
             <a:endParaRPr lang="uk-UA" sz="3400" dirty="0" smtClean="0"/>
@@ -6994,10 +7014,6 @@
               </a:rPr>
               <a:t>Приклад медичного обліку</a:t>
             </a:r>
-            <a:endParaRPr lang="uk-UA" b="1" dirty="0" smtClean="0">
-              <a:latin typeface="Times New Roman" panose="02020603050405020304" pitchFamily="18" charset="0"/>
-              <a:cs typeface="Times New Roman" panose="02020603050405020304" pitchFamily="18" charset="0"/>
-            </a:endParaRPr>
           </a:p>
           <a:p>
             <a:pPr algn="ctr"/>
@@ -7141,10 +7157,6 @@
               </a:rPr>
               <a:t>Приклад перегляду історії хворого</a:t>
             </a:r>
-            <a:endParaRPr lang="uk-UA" b="1" dirty="0" smtClean="0">
-              <a:latin typeface="Times New Roman" panose="02020603050405020304" pitchFamily="18" charset="0"/>
-              <a:cs typeface="Times New Roman" panose="02020603050405020304" pitchFamily="18" charset="0"/>
-            </a:endParaRPr>
           </a:p>
           <a:p>
             <a:pPr algn="ctr"/>
@@ -7997,346 +8009,6 @@
       </p:grpSpPr>
       <p:sp>
         <p:nvSpPr>
-          <p:cNvPr id="2" name="Заголовок 1"/>
-          <p:cNvSpPr txBox="1">
-            <a:spLocks/>
-          </p:cNvSpPr>
-          <p:nvPr/>
-        </p:nvSpPr>
-        <p:spPr>
-          <a:xfrm>
-            <a:off x="635000" y="331660"/>
-            <a:ext cx="10922000" cy="634082"/>
-          </a:xfrm>
-          <a:prstGeom prst="rect">
-            <a:avLst/>
-          </a:prstGeom>
-        </p:spPr>
-        <p:txBody>
-          <a:bodyPr>
-            <a:normAutofit fontScale="90000" lnSpcReduction="10000"/>
-          </a:bodyPr>
-          <a:lstStyle>
-            <a:lvl1pPr algn="l" defTabSz="914400" rtl="0" eaLnBrk="1" latinLnBrk="0" hangingPunct="1">
-              <a:lnSpc>
-                <a:spcPct val="90000"/>
-              </a:lnSpc>
-              <a:spcBef>
-                <a:spcPct val="0"/>
-              </a:spcBef>
-              <a:buNone/>
-              <a:defRPr sz="4400" kern="1200">
-                <a:solidFill>
-                  <a:schemeClr val="tx1"/>
-                </a:solidFill>
-                <a:latin typeface="+mj-lt"/>
-                <a:ea typeface="+mj-ea"/>
-                <a:cs typeface="+mj-cs"/>
-              </a:defRPr>
-            </a:lvl1pPr>
-          </a:lstStyle>
-          <a:p>
-            <a:pPr algn="ctr"/>
-            <a:r>
-              <a:rPr lang="uk-UA" b="1" dirty="0" smtClean="0">
-                <a:latin typeface="Times New Roman" panose="02020603050405020304" pitchFamily="18" charset="0"/>
-                <a:cs typeface="Times New Roman" panose="02020603050405020304" pitchFamily="18" charset="0"/>
-              </a:rPr>
-              <a:t>Висновки</a:t>
-            </a:r>
-          </a:p>
-          <a:p>
-            <a:pPr algn="ctr"/>
-            <a:endParaRPr lang="ru-RU" b="1" dirty="0">
-              <a:latin typeface="Times New Roman" panose="02020603050405020304" pitchFamily="18" charset="0"/>
-              <a:cs typeface="Times New Roman" panose="02020603050405020304" pitchFamily="18" charset="0"/>
-            </a:endParaRPr>
-          </a:p>
-        </p:txBody>
-      </p:sp>
-      <p:sp>
-        <p:nvSpPr>
-          <p:cNvPr id="3" name="TextBox 2"/>
-          <p:cNvSpPr txBox="1"/>
-          <p:nvPr/>
-        </p:nvSpPr>
-        <p:spPr>
-          <a:xfrm>
-            <a:off x="207433" y="1089164"/>
-            <a:ext cx="11777133" cy="5632311"/>
-          </a:xfrm>
-          <a:prstGeom prst="rect">
-            <a:avLst/>
-          </a:prstGeom>
-          <a:noFill/>
-        </p:spPr>
-        <p:txBody>
-          <a:bodyPr wrap="square" rtlCol="0">
-            <a:spAutoFit/>
-          </a:bodyPr>
-          <a:lstStyle/>
-          <a:p>
-            <a:r>
-              <a:rPr lang="uk-UA" sz="3600" dirty="0"/>
-              <a:t>В ході дипломної роботи було: </a:t>
-            </a:r>
-            <a:endParaRPr lang="ru-RU" sz="3600" dirty="0"/>
-          </a:p>
-          <a:p>
-            <a:r>
-              <a:rPr lang="ru-RU" sz="3600" dirty="0" smtClean="0"/>
-              <a:t>- Проведено </a:t>
-            </a:r>
-            <a:r>
-              <a:rPr lang="uk-UA" sz="3600" dirty="0" smtClean="0"/>
-              <a:t>аналіз предметної області та сучасних аналогів</a:t>
-            </a:r>
-            <a:r>
-              <a:rPr lang="ru-RU" sz="3600" dirty="0" smtClean="0"/>
-              <a:t>;</a:t>
-            </a:r>
-            <a:endParaRPr lang="ru-RU" sz="3600" dirty="0"/>
-          </a:p>
-          <a:p>
-            <a:r>
-              <a:rPr lang="ru-RU" sz="3600" dirty="0" smtClean="0"/>
-              <a:t>- </a:t>
-            </a:r>
-            <a:r>
-              <a:rPr lang="ru-RU" sz="3600" dirty="0" err="1" smtClean="0"/>
-              <a:t>Виявлені</a:t>
-            </a:r>
-            <a:r>
-              <a:rPr lang="ru-RU" sz="3600" dirty="0" smtClean="0"/>
-              <a:t> </a:t>
-            </a:r>
-            <a:r>
-              <a:rPr lang="ru-RU" sz="3600" dirty="0" err="1" smtClean="0"/>
-              <a:t>недоліки</a:t>
-            </a:r>
-            <a:r>
-              <a:rPr lang="ru-RU" sz="3600" dirty="0" smtClean="0"/>
-              <a:t> та </a:t>
-            </a:r>
-            <a:r>
-              <a:rPr lang="ru-RU" sz="3600" dirty="0" err="1" smtClean="0"/>
-              <a:t>переваги</a:t>
-            </a:r>
-            <a:r>
-              <a:rPr lang="ru-RU" sz="3600" dirty="0" smtClean="0"/>
-              <a:t> </a:t>
-            </a:r>
-            <a:r>
-              <a:rPr lang="ru-RU" sz="3600" dirty="0" err="1" smtClean="0"/>
-              <a:t>сучасних</a:t>
-            </a:r>
-            <a:r>
-              <a:rPr lang="ru-RU" sz="3600" dirty="0" smtClean="0"/>
-              <a:t> систем;</a:t>
-            </a:r>
-          </a:p>
-          <a:p>
-            <a:r>
-              <a:rPr lang="ru-RU" sz="3600" dirty="0" smtClean="0"/>
-              <a:t>- </a:t>
-            </a:r>
-            <a:r>
-              <a:rPr lang="ru-RU" sz="3600" dirty="0" err="1" smtClean="0"/>
-              <a:t>Розроблені</a:t>
-            </a:r>
-            <a:r>
-              <a:rPr lang="ru-RU" sz="3600" dirty="0" smtClean="0"/>
-              <a:t> </a:t>
-            </a:r>
-            <a:r>
-              <a:rPr lang="ru-RU" sz="3600" dirty="0" err="1" smtClean="0"/>
-              <a:t>вимоги</a:t>
-            </a:r>
-            <a:r>
-              <a:rPr lang="ru-RU" sz="3600" dirty="0" smtClean="0"/>
-              <a:t> та </a:t>
-            </a:r>
-            <a:r>
-              <a:rPr lang="ru-RU" sz="3600" dirty="0" err="1" smtClean="0"/>
-              <a:t>бізнес</a:t>
-            </a:r>
-            <a:r>
-              <a:rPr lang="ru-RU" sz="3600" dirty="0" smtClean="0"/>
-              <a:t> </a:t>
-            </a:r>
-            <a:r>
-              <a:rPr lang="ru-RU" sz="3600" dirty="0" err="1" smtClean="0"/>
-              <a:t>процеси</a:t>
-            </a:r>
-            <a:r>
-              <a:rPr lang="ru-RU" sz="3600" dirty="0" smtClean="0"/>
-              <a:t> </a:t>
-            </a:r>
-            <a:r>
-              <a:rPr lang="ru-RU" sz="3600" dirty="0" err="1" smtClean="0"/>
-              <a:t>маайбутнього</a:t>
-            </a:r>
-            <a:r>
-              <a:rPr lang="ru-RU" sz="3600" dirty="0" smtClean="0"/>
-              <a:t> ПЗ, </a:t>
-            </a:r>
-            <a:r>
-              <a:rPr lang="ru-RU" sz="3600" dirty="0" err="1" smtClean="0"/>
-              <a:t>що</a:t>
-            </a:r>
-            <a:r>
-              <a:rPr lang="ru-RU" sz="3600" dirty="0" smtClean="0"/>
-              <a:t> буде </a:t>
-            </a:r>
-            <a:r>
-              <a:rPr lang="ru-RU" sz="3600" dirty="0" err="1" smtClean="0"/>
-              <a:t>вирішувати</a:t>
-            </a:r>
-            <a:r>
-              <a:rPr lang="ru-RU" sz="3600" dirty="0" smtClean="0"/>
-              <a:t> </a:t>
-            </a:r>
-            <a:r>
-              <a:rPr lang="ru-RU" sz="3600" dirty="0" err="1" smtClean="0"/>
-              <a:t>поставлені</a:t>
-            </a:r>
-            <a:r>
-              <a:rPr lang="ru-RU" sz="3600" dirty="0" smtClean="0"/>
-              <a:t> </a:t>
-            </a:r>
-            <a:r>
-              <a:rPr lang="ru-RU" sz="3600" dirty="0" err="1" smtClean="0"/>
-              <a:t>проблеми</a:t>
-            </a:r>
-            <a:r>
-              <a:rPr lang="ru-RU" sz="3600" dirty="0"/>
-              <a:t>;</a:t>
-            </a:r>
-          </a:p>
-          <a:p>
-            <a:r>
-              <a:rPr lang="ru-RU" sz="3600" dirty="0" smtClean="0"/>
-              <a:t>- </a:t>
-            </a:r>
-            <a:r>
-              <a:rPr lang="ru-RU" sz="3600" dirty="0" err="1" smtClean="0"/>
-              <a:t>Розроблена</a:t>
-            </a:r>
-            <a:r>
-              <a:rPr lang="ru-RU" sz="3600" dirty="0" smtClean="0"/>
-              <a:t> </a:t>
-            </a:r>
-            <a:r>
-              <a:rPr lang="ru-RU" sz="3600" dirty="0" err="1" smtClean="0"/>
-              <a:t>архітектурні</a:t>
-            </a:r>
-            <a:r>
-              <a:rPr lang="ru-RU" sz="3600" dirty="0" smtClean="0"/>
-              <a:t> </a:t>
-            </a:r>
-            <a:r>
-              <a:rPr lang="ru-RU" sz="3600" dirty="0" err="1" smtClean="0"/>
-              <a:t>рішення</a:t>
-            </a:r>
-            <a:r>
-              <a:rPr lang="ru-RU" sz="3600" dirty="0" smtClean="0"/>
-              <a:t>;</a:t>
-            </a:r>
-            <a:endParaRPr lang="ru-RU" sz="3600" dirty="0"/>
-          </a:p>
-          <a:p>
-            <a:r>
-              <a:rPr lang="uk-UA" sz="3600" dirty="0" smtClean="0"/>
-              <a:t>- Розроблено та </a:t>
-            </a:r>
-            <a:r>
-              <a:rPr lang="uk-UA" sz="3600" dirty="0" err="1" smtClean="0"/>
-              <a:t>протестовано</a:t>
-            </a:r>
-            <a:r>
-              <a:rPr lang="uk-UA" sz="3600" dirty="0" smtClean="0"/>
-              <a:t> систему </a:t>
-            </a:r>
-            <a:r>
-              <a:rPr lang="uk-UA" sz="3600" dirty="0" err="1" smtClean="0"/>
-              <a:t>токенізації</a:t>
-            </a:r>
-            <a:r>
-              <a:rPr lang="uk-UA" sz="3600" dirty="0" smtClean="0"/>
-              <a:t>;</a:t>
-            </a:r>
-          </a:p>
-          <a:p>
-            <a:r>
-              <a:rPr lang="uk-UA" sz="3600" dirty="0" smtClean="0"/>
-              <a:t>- Розроблено тестовий застосунок, що має показати як можна використовувати можливості системи.</a:t>
-            </a:r>
-            <a:endParaRPr lang="ru-RU" sz="3600" dirty="0"/>
-          </a:p>
-        </p:txBody>
-      </p:sp>
-      <p:sp>
-        <p:nvSpPr>
-          <p:cNvPr id="4" name="Номер слайда 3"/>
-          <p:cNvSpPr>
-            <a:spLocks noGrp="1"/>
-          </p:cNvSpPr>
-          <p:nvPr>
-            <p:ph type="sldNum" sz="quarter" idx="12"/>
-          </p:nvPr>
-        </p:nvSpPr>
-        <p:spPr/>
-        <p:txBody>
-          <a:bodyPr/>
-          <a:lstStyle/>
-          <a:p>
-            <a:fld id="{E09DD669-CC1A-4D24-BC6B-97BA35B3733B}" type="slidenum">
-              <a:rPr lang="ru-RU" smtClean="0"/>
-              <a:t>31</a:t>
-            </a:fld>
-            <a:endParaRPr lang="ru-RU" dirty="0"/>
-          </a:p>
-        </p:txBody>
-      </p:sp>
-    </p:spTree>
-    <p:extLst>
-      <p:ext uri="{BB962C8B-B14F-4D97-AF65-F5344CB8AC3E}">
-        <p14:creationId xmlns:p14="http://schemas.microsoft.com/office/powerpoint/2010/main" val="282610210"/>
-      </p:ext>
-    </p:extLst>
-  </p:cSld>
-  <p:clrMapOvr>
-    <a:masterClrMapping/>
-  </p:clrMapOvr>
-  <p:timing>
-    <p:tnLst>
-      <p:par>
-        <p:cTn id="1" dur="indefinite" restart="never" nodeType="tmRoot"/>
-      </p:par>
-    </p:tnLst>
-  </p:timing>
-</p:sld>
-</file>
-
-<file path=ppt/slides/slide32.xml><?xml version="1.0" encoding="utf-8"?>
-<p:sld xmlns:a="http://schemas.openxmlformats.org/drawingml/2006/main" xmlns:r="http://schemas.openxmlformats.org/officeDocument/2006/relationships" xmlns:p="http://schemas.openxmlformats.org/presentationml/2006/main">
-  <p:cSld>
-    <p:spTree>
-      <p:nvGrpSpPr>
-        <p:cNvPr id="1" name=""/>
-        <p:cNvGrpSpPr/>
-        <p:nvPr/>
-      </p:nvGrpSpPr>
-      <p:grpSpPr>
-        <a:xfrm>
-          <a:off x="0" y="0"/>
-          <a:ext cx="0" cy="0"/>
-          <a:chOff x="0" y="0"/>
-          <a:chExt cx="0" cy="0"/>
-        </a:xfrm>
-      </p:grpSpPr>
-      <p:sp>
-        <p:nvSpPr>
           <p:cNvPr id="2" name="TextBox 1"/>
           <p:cNvSpPr txBox="1"/>
           <p:nvPr/>
@@ -8388,7 +8060,7 @@
           <a:p>
             <a:fld id="{E09DD669-CC1A-4D24-BC6B-97BA35B3733B}" type="slidenum">
               <a:rPr lang="ru-RU" smtClean="0"/>
-              <a:t>32</a:t>
+              <a:t>31</a:t>
             </a:fld>
             <a:endParaRPr lang="ru-RU"/>
           </a:p>
@@ -10055,19 +9727,23 @@
           <a:p>
             <a:pPr algn="ctr"/>
             <a:r>
-              <a:rPr lang="uk-UA" b="1" dirty="0" err="1" smtClean="0">
-                <a:latin typeface="Times New Roman" panose="02020603050405020304" pitchFamily="18" charset="0"/>
-                <a:cs typeface="Times New Roman" panose="02020603050405020304" pitchFamily="18" charset="0"/>
-              </a:rPr>
-              <a:t>Електроний</a:t>
-            </a:r>
-            <a:r>
               <a:rPr lang="uk-UA" b="1" dirty="0" smtClean="0">
                 <a:latin typeface="Times New Roman" panose="02020603050405020304" pitchFamily="18" charset="0"/>
                 <a:cs typeface="Times New Roman" panose="02020603050405020304" pitchFamily="18" charset="0"/>
               </a:rPr>
-              <a:t> підпис</a:t>
-            </a:r>
+              <a:t>Технологія </a:t>
+            </a:r>
+            <a:r>
+              <a:rPr lang="en-US" b="1" dirty="0" smtClean="0">
+                <a:latin typeface="Times New Roman" panose="02020603050405020304" pitchFamily="18" charset="0"/>
+                <a:cs typeface="Times New Roman" panose="02020603050405020304" pitchFamily="18" charset="0"/>
+              </a:rPr>
+              <a:t>Peer-To-Peer</a:t>
+            </a:r>
+            <a:endParaRPr lang="uk-UA" b="1" dirty="0" smtClean="0">
+              <a:latin typeface="Times New Roman" panose="02020603050405020304" pitchFamily="18" charset="0"/>
+              <a:cs typeface="Times New Roman" panose="02020603050405020304" pitchFamily="18" charset="0"/>
+            </a:endParaRPr>
           </a:p>
           <a:p>
             <a:pPr algn="ctr"/>
@@ -10078,12 +9754,33 @@
           </a:p>
         </p:txBody>
       </p:sp>
+      <p:sp>
+        <p:nvSpPr>
+          <p:cNvPr id="4" name="Номер слайда 3"/>
+          <p:cNvSpPr>
+            <a:spLocks noGrp="1"/>
+          </p:cNvSpPr>
+          <p:nvPr>
+            <p:ph type="sldNum" sz="quarter" idx="12"/>
+          </p:nvPr>
+        </p:nvSpPr>
+        <p:spPr/>
+        <p:txBody>
+          <a:bodyPr/>
+          <a:lstStyle/>
+          <a:p>
+            <a:fld id="{E09DD669-CC1A-4D24-BC6B-97BA35B3733B}" type="slidenum">
+              <a:rPr lang="ru-RU" smtClean="0"/>
+              <a:t>9</a:t>
+            </a:fld>
+            <a:endParaRPr lang="ru-RU"/>
+          </a:p>
+        </p:txBody>
+      </p:sp>
       <p:pic>
         <p:nvPicPr>
-          <p:cNvPr id="4" name="Рисунок 3"/>
-          <p:cNvPicPr>
-            <a:picLocks noChangeAspect="1"/>
-          </p:cNvPicPr>
+          <p:cNvPr id="5" name="Рисунок 4"/>
+          <p:cNvPicPr/>
           <p:nvPr/>
         </p:nvPicPr>
         <p:blipFill>
@@ -10094,41 +9791,18 @@
         </p:blipFill>
         <p:spPr>
           <a:xfrm>
-            <a:off x="462203" y="1152009"/>
-            <a:ext cx="11267594" cy="5207712"/>
+            <a:off x="1516545" y="1378906"/>
+            <a:ext cx="9158910" cy="4564280"/>
           </a:xfrm>
           <a:prstGeom prst="rect">
             <a:avLst/>
           </a:prstGeom>
         </p:spPr>
       </p:pic>
-      <p:sp>
-        <p:nvSpPr>
-          <p:cNvPr id="3" name="Номер слайда 2"/>
-          <p:cNvSpPr>
-            <a:spLocks noGrp="1"/>
-          </p:cNvSpPr>
-          <p:nvPr>
-            <p:ph type="sldNum" sz="quarter" idx="12"/>
-          </p:nvPr>
-        </p:nvSpPr>
-        <p:spPr/>
-        <p:txBody>
-          <a:bodyPr/>
-          <a:lstStyle/>
-          <a:p>
-            <a:fld id="{E09DD669-CC1A-4D24-BC6B-97BA35B3733B}" type="slidenum">
-              <a:rPr lang="ru-RU" smtClean="0"/>
-              <a:t>9</a:t>
-            </a:fld>
-            <a:endParaRPr lang="ru-RU"/>
-          </a:p>
-        </p:txBody>
-      </p:sp>
     </p:spTree>
     <p:extLst>
       <p:ext uri="{BB962C8B-B14F-4D97-AF65-F5344CB8AC3E}">
-        <p14:creationId xmlns:p14="http://schemas.microsoft.com/office/powerpoint/2010/main" val="4062522497"/>
+        <p14:creationId xmlns:p14="http://schemas.microsoft.com/office/powerpoint/2010/main" val="4024560913"/>
       </p:ext>
     </p:extLst>
   </p:cSld>

</xml_diff>